<commit_message>
added the last slide
</commit_message>
<xml_diff>
--- a/SecondSeminar.pptx
+++ b/SecondSeminar.pptx
@@ -6,10 +6,11 @@
   </p:sldMasterIdLst>
   <p:sldIdLst>
     <p:sldId id="256" r:id="rId2"/>
-    <p:sldId id="257" r:id="rId3"/>
-    <p:sldId id="258" r:id="rId4"/>
-    <p:sldId id="259" r:id="rId5"/>
-    <p:sldId id="260" r:id="rId6"/>
+    <p:sldId id="261" r:id="rId3"/>
+    <p:sldId id="257" r:id="rId4"/>
+    <p:sldId id="258" r:id="rId5"/>
+    <p:sldId id="259" r:id="rId6"/>
+    <p:sldId id="260" r:id="rId7"/>
   </p:sldIdLst>
   <p:sldSz cx="12192000" cy="6858000"/>
   <p:notesSz cx="6858000" cy="9144000"/>
@@ -5924,6 +5925,412 @@
           <p:cNvPr id="2" name="Заголовок 1">
             <a:extLst>
               <a:ext uri="{FF2B5EF4-FFF2-40B4-BE49-F238E27FC236}">
+                <a16:creationId xmlns:a16="http://schemas.microsoft.com/office/drawing/2014/main" id="{A0CF50C9-13C8-43EF-969B-33AFCAAFFCB6}"/>
+              </a:ext>
+            </a:extLst>
+          </p:cNvPr>
+          <p:cNvSpPr>
+            <a:spLocks noGrp="1"/>
+          </p:cNvSpPr>
+          <p:nvPr>
+            <p:ph type="title"/>
+          </p:nvPr>
+        </p:nvSpPr>
+        <p:spPr>
+          <a:xfrm>
+            <a:off x="677334" y="243507"/>
+            <a:ext cx="8956996" cy="1278466"/>
+          </a:xfrm>
+        </p:spPr>
+        <p:txBody>
+          <a:bodyPr>
+            <a:normAutofit fontScale="90000"/>
+          </a:bodyPr>
+          <a:lstStyle/>
+          <a:p>
+            <a:r>
+              <a:rPr lang="ru-RU" sz="2800" dirty="0"/>
+              <a:t>P.P.S. Как говорил мой старший брат-программист: тыкай все кнопки! Ты ничего тут не сможешь безвозвратно сломать.</a:t>
+            </a:r>
+          </a:p>
+        </p:txBody>
+      </p:sp>
+      <p:pic>
+        <p:nvPicPr>
+          <p:cNvPr id="6" name="Объект 5">
+            <a:extLst>
+              <a:ext uri="{FF2B5EF4-FFF2-40B4-BE49-F238E27FC236}">
+                <a16:creationId xmlns:a16="http://schemas.microsoft.com/office/drawing/2014/main" id="{F4873772-6687-4283-B76F-6CCD20312893}"/>
+              </a:ext>
+            </a:extLst>
+          </p:cNvPr>
+          <p:cNvPicPr>
+            <a:picLocks noGrp="1" noChangeAspect="1"/>
+          </p:cNvPicPr>
+          <p:nvPr>
+            <p:ph idx="1"/>
+          </p:nvPr>
+        </p:nvPicPr>
+        <p:blipFill>
+          <a:blip r:embed="rId2">
+            <a:extLst>
+              <a:ext uri="{28A0092B-C50C-407E-A947-70E740481C1C}">
+                <a14:useLocalDpi xmlns:a14="http://schemas.microsoft.com/office/drawing/2010/main" val="0"/>
+              </a:ext>
+            </a:extLst>
+          </a:blip>
+          <a:stretch>
+            <a:fillRect/>
+          </a:stretch>
+        </p:blipFill>
+        <p:spPr>
+          <a:xfrm>
+            <a:off x="3786723" y="2715682"/>
+            <a:ext cx="2974900" cy="2132012"/>
+          </a:xfrm>
+        </p:spPr>
+      </p:pic>
+      <p:sp>
+        <p:nvSpPr>
+          <p:cNvPr id="4" name="Текст 3">
+            <a:extLst>
+              <a:ext uri="{FF2B5EF4-FFF2-40B4-BE49-F238E27FC236}">
+                <a16:creationId xmlns:a16="http://schemas.microsoft.com/office/drawing/2014/main" id="{6BAA96CB-76D5-4A7C-98C5-77EE9D0BB575}"/>
+              </a:ext>
+            </a:extLst>
+          </p:cNvPr>
+          <p:cNvSpPr>
+            <a:spLocks noGrp="1"/>
+          </p:cNvSpPr>
+          <p:nvPr>
+            <p:ph type="body" sz="half" idx="2"/>
+          </p:nvPr>
+        </p:nvSpPr>
+        <p:spPr>
+          <a:xfrm>
+            <a:off x="3419060" y="1914664"/>
+            <a:ext cx="3710227" cy="801018"/>
+          </a:xfrm>
+        </p:spPr>
+        <p:txBody>
+          <a:bodyPr>
+            <a:normAutofit/>
+          </a:bodyPr>
+          <a:lstStyle/>
+          <a:p>
+            <a:pPr algn="ctr"/>
+            <a:r>
+              <a:rPr lang="ru-RU" sz="2000" dirty="0"/>
+              <a:t>Очень мотивирует!</a:t>
+            </a:r>
+          </a:p>
+        </p:txBody>
+      </p:sp>
+      <p:sp>
+        <p:nvSpPr>
+          <p:cNvPr id="7" name="Текст 3">
+            <a:extLst>
+              <a:ext uri="{FF2B5EF4-FFF2-40B4-BE49-F238E27FC236}">
+                <a16:creationId xmlns:a16="http://schemas.microsoft.com/office/drawing/2014/main" id="{C44F571D-1EDF-4598-B6F4-C298133B0F0B}"/>
+              </a:ext>
+            </a:extLst>
+          </p:cNvPr>
+          <p:cNvSpPr txBox="1">
+            <a:spLocks/>
+          </p:cNvSpPr>
+          <p:nvPr/>
+        </p:nvSpPr>
+        <p:spPr>
+          <a:xfrm>
+            <a:off x="2650241" y="5406611"/>
+            <a:ext cx="5247863" cy="801018"/>
+          </a:xfrm>
+          <a:prstGeom prst="rect">
+            <a:avLst/>
+          </a:prstGeom>
+        </p:spPr>
+        <p:txBody>
+          <a:bodyPr vert="horz" lIns="91440" tIns="45720" rIns="91440" bIns="45720" rtlCol="0">
+            <a:normAutofit fontScale="92500"/>
+          </a:bodyPr>
+          <a:lstStyle>
+            <a:lvl1pPr marL="0" indent="0" algn="l" defTabSz="457200" rtl="0" eaLnBrk="1" latinLnBrk="0" hangingPunct="1">
+              <a:spcBef>
+                <a:spcPts val="1000"/>
+              </a:spcBef>
+              <a:spcAft>
+                <a:spcPts val="0"/>
+              </a:spcAft>
+              <a:buClr>
+                <a:schemeClr val="accent1"/>
+              </a:buClr>
+              <a:buSzPct val="80000"/>
+              <a:buFont typeface="Wingdings 3" charset="2"/>
+              <a:buNone/>
+              <a:defRPr sz="1400" kern="1200">
+                <a:solidFill>
+                  <a:schemeClr val="tx1">
+                    <a:lumMod val="75000"/>
+                    <a:lumOff val="25000"/>
+                  </a:schemeClr>
+                </a:solidFill>
+                <a:latin typeface="+mn-lt"/>
+                <a:ea typeface="+mn-ea"/>
+                <a:cs typeface="+mn-cs"/>
+              </a:defRPr>
+            </a:lvl1pPr>
+            <a:lvl2pPr marL="457063" indent="0" algn="l" defTabSz="457200" rtl="0" eaLnBrk="1" latinLnBrk="0" hangingPunct="1">
+              <a:spcBef>
+                <a:spcPts val="1000"/>
+              </a:spcBef>
+              <a:spcAft>
+                <a:spcPts val="0"/>
+              </a:spcAft>
+              <a:buClr>
+                <a:schemeClr val="accent1"/>
+              </a:buClr>
+              <a:buSzPct val="80000"/>
+              <a:buFont typeface="Wingdings 3" charset="2"/>
+              <a:buNone/>
+              <a:defRPr sz="1400" kern="1200">
+                <a:solidFill>
+                  <a:schemeClr val="tx1">
+                    <a:lumMod val="75000"/>
+                    <a:lumOff val="25000"/>
+                  </a:schemeClr>
+                </a:solidFill>
+                <a:latin typeface="+mn-lt"/>
+                <a:ea typeface="+mn-ea"/>
+                <a:cs typeface="+mn-cs"/>
+              </a:defRPr>
+            </a:lvl2pPr>
+            <a:lvl3pPr marL="914126" indent="0" algn="l" defTabSz="457200" rtl="0" eaLnBrk="1" latinLnBrk="0" hangingPunct="1">
+              <a:spcBef>
+                <a:spcPts val="1000"/>
+              </a:spcBef>
+              <a:spcAft>
+                <a:spcPts val="0"/>
+              </a:spcAft>
+              <a:buClr>
+                <a:schemeClr val="accent1"/>
+              </a:buClr>
+              <a:buSzPct val="80000"/>
+              <a:buFont typeface="Wingdings 3" charset="2"/>
+              <a:buNone/>
+              <a:defRPr sz="1200" kern="1200">
+                <a:solidFill>
+                  <a:schemeClr val="tx1">
+                    <a:lumMod val="75000"/>
+                    <a:lumOff val="25000"/>
+                  </a:schemeClr>
+                </a:solidFill>
+                <a:latin typeface="+mn-lt"/>
+                <a:ea typeface="+mn-ea"/>
+                <a:cs typeface="+mn-cs"/>
+              </a:defRPr>
+            </a:lvl3pPr>
+            <a:lvl4pPr marL="1371189" indent="0" algn="l" defTabSz="457200" rtl="0" eaLnBrk="1" latinLnBrk="0" hangingPunct="1">
+              <a:spcBef>
+                <a:spcPts val="1000"/>
+              </a:spcBef>
+              <a:spcAft>
+                <a:spcPts val="0"/>
+              </a:spcAft>
+              <a:buClr>
+                <a:schemeClr val="accent1"/>
+              </a:buClr>
+              <a:buSzPct val="80000"/>
+              <a:buFont typeface="Wingdings 3" charset="2"/>
+              <a:buNone/>
+              <a:defRPr sz="1000" kern="1200">
+                <a:solidFill>
+                  <a:schemeClr val="tx1">
+                    <a:lumMod val="75000"/>
+                    <a:lumOff val="25000"/>
+                  </a:schemeClr>
+                </a:solidFill>
+                <a:latin typeface="+mn-lt"/>
+                <a:ea typeface="+mn-ea"/>
+                <a:cs typeface="+mn-cs"/>
+              </a:defRPr>
+            </a:lvl4pPr>
+            <a:lvl5pPr marL="1828251" indent="0" algn="l" defTabSz="457200" rtl="0" eaLnBrk="1" latinLnBrk="0" hangingPunct="1">
+              <a:spcBef>
+                <a:spcPts val="1000"/>
+              </a:spcBef>
+              <a:spcAft>
+                <a:spcPts val="0"/>
+              </a:spcAft>
+              <a:buClr>
+                <a:schemeClr val="accent1"/>
+              </a:buClr>
+              <a:buSzPct val="80000"/>
+              <a:buFont typeface="Wingdings 3" charset="2"/>
+              <a:buNone/>
+              <a:defRPr sz="1000" kern="1200">
+                <a:solidFill>
+                  <a:schemeClr val="tx1">
+                    <a:lumMod val="75000"/>
+                    <a:lumOff val="25000"/>
+                  </a:schemeClr>
+                </a:solidFill>
+                <a:latin typeface="+mn-lt"/>
+                <a:ea typeface="+mn-ea"/>
+                <a:cs typeface="+mn-cs"/>
+              </a:defRPr>
+            </a:lvl5pPr>
+            <a:lvl6pPr marL="2285314" indent="0" algn="l" defTabSz="457200" rtl="0" eaLnBrk="1" latinLnBrk="0" hangingPunct="1">
+              <a:spcBef>
+                <a:spcPts val="1000"/>
+              </a:spcBef>
+              <a:spcAft>
+                <a:spcPts val="0"/>
+              </a:spcAft>
+              <a:buClr>
+                <a:schemeClr val="accent1"/>
+              </a:buClr>
+              <a:buSzPct val="80000"/>
+              <a:buFont typeface="Wingdings 3" charset="2"/>
+              <a:buNone/>
+              <a:defRPr sz="1000" kern="1200">
+                <a:solidFill>
+                  <a:schemeClr val="tx1">
+                    <a:lumMod val="75000"/>
+                    <a:lumOff val="25000"/>
+                  </a:schemeClr>
+                </a:solidFill>
+                <a:latin typeface="+mn-lt"/>
+                <a:ea typeface="+mn-ea"/>
+                <a:cs typeface="+mn-cs"/>
+              </a:defRPr>
+            </a:lvl6pPr>
+            <a:lvl7pPr marL="2742377" indent="0" algn="l" defTabSz="457200" rtl="0" eaLnBrk="1" latinLnBrk="0" hangingPunct="1">
+              <a:spcBef>
+                <a:spcPts val="1000"/>
+              </a:spcBef>
+              <a:spcAft>
+                <a:spcPts val="0"/>
+              </a:spcAft>
+              <a:buClr>
+                <a:schemeClr val="accent1"/>
+              </a:buClr>
+              <a:buSzPct val="80000"/>
+              <a:buFont typeface="Wingdings 3" charset="2"/>
+              <a:buNone/>
+              <a:defRPr sz="1000" kern="1200">
+                <a:solidFill>
+                  <a:schemeClr val="tx1">
+                    <a:lumMod val="75000"/>
+                    <a:lumOff val="25000"/>
+                  </a:schemeClr>
+                </a:solidFill>
+                <a:latin typeface="+mn-lt"/>
+                <a:ea typeface="+mn-ea"/>
+                <a:cs typeface="+mn-cs"/>
+              </a:defRPr>
+            </a:lvl7pPr>
+            <a:lvl8pPr marL="3199440" indent="0" algn="l" defTabSz="457200" rtl="0" eaLnBrk="1" latinLnBrk="0" hangingPunct="1">
+              <a:spcBef>
+                <a:spcPts val="1000"/>
+              </a:spcBef>
+              <a:spcAft>
+                <a:spcPts val="0"/>
+              </a:spcAft>
+              <a:buClr>
+                <a:schemeClr val="accent1"/>
+              </a:buClr>
+              <a:buSzPct val="80000"/>
+              <a:buFont typeface="Wingdings 3" charset="2"/>
+              <a:buNone/>
+              <a:defRPr sz="1000" kern="1200">
+                <a:solidFill>
+                  <a:schemeClr val="tx1">
+                    <a:lumMod val="75000"/>
+                    <a:lumOff val="25000"/>
+                  </a:schemeClr>
+                </a:solidFill>
+                <a:latin typeface="+mn-lt"/>
+                <a:ea typeface="+mn-ea"/>
+                <a:cs typeface="+mn-cs"/>
+              </a:defRPr>
+            </a:lvl8pPr>
+            <a:lvl9pPr marL="3656503" indent="0" algn="l" defTabSz="457200" rtl="0" eaLnBrk="1" latinLnBrk="0" hangingPunct="1">
+              <a:spcBef>
+                <a:spcPts val="1000"/>
+              </a:spcBef>
+              <a:spcAft>
+                <a:spcPts val="0"/>
+              </a:spcAft>
+              <a:buClr>
+                <a:schemeClr val="accent1"/>
+              </a:buClr>
+              <a:buSzPct val="80000"/>
+              <a:buFont typeface="Wingdings 3" charset="2"/>
+              <a:buNone/>
+              <a:defRPr sz="1000" kern="1200">
+                <a:solidFill>
+                  <a:schemeClr val="tx1">
+                    <a:lumMod val="75000"/>
+                    <a:lumOff val="25000"/>
+                  </a:schemeClr>
+                </a:solidFill>
+                <a:latin typeface="+mn-lt"/>
+                <a:ea typeface="+mn-ea"/>
+                <a:cs typeface="+mn-cs"/>
+              </a:defRPr>
+            </a:lvl9pPr>
+          </a:lstStyle>
+          <a:p>
+            <a:pPr algn="ctr"/>
+            <a:r>
+              <a:rPr lang="ru-RU" sz="1600" dirty="0"/>
+              <a:t>Надеюсь, всего понатыканного на сей раз достаточно.</a:t>
+            </a:r>
+          </a:p>
+          <a:p>
+            <a:pPr algn="ctr"/>
+            <a:r>
+              <a:rPr lang="ru-RU" sz="1600" dirty="0"/>
+              <a:t>Спасибо за внимание.</a:t>
+            </a:r>
+          </a:p>
+        </p:txBody>
+      </p:sp>
+    </p:spTree>
+    <p:extLst>
+      <p:ext uri="{BB962C8B-B14F-4D97-AF65-F5344CB8AC3E}">
+        <p14:creationId xmlns:p14="http://schemas.microsoft.com/office/powerpoint/2010/main" val="1853372621"/>
+      </p:ext>
+    </p:extLst>
+  </p:cSld>
+  <p:clrMapOvr>
+    <a:masterClrMapping/>
+  </p:clrMapOvr>
+</p:sld>
+</file>
+
+<file path=ppt/slides/slide3.xml><?xml version="1.0" encoding="utf-8"?>
+<p:sld xmlns:a="http://schemas.openxmlformats.org/drawingml/2006/main" xmlns:r="http://schemas.openxmlformats.org/officeDocument/2006/relationships" xmlns:p="http://schemas.openxmlformats.org/presentationml/2006/main">
+  <p:cSld>
+    <p:spTree>
+      <p:nvGrpSpPr>
+        <p:cNvPr id="1" name=""/>
+        <p:cNvGrpSpPr/>
+        <p:nvPr/>
+      </p:nvGrpSpPr>
+      <p:grpSpPr>
+        <a:xfrm>
+          <a:off x="0" y="0"/>
+          <a:ext cx="0" cy="0"/>
+          <a:chOff x="0" y="0"/>
+          <a:chExt cx="0" cy="0"/>
+        </a:xfrm>
+      </p:grpSpPr>
+      <p:sp>
+        <p:nvSpPr>
+          <p:cNvPr id="2" name="Заголовок 1">
+            <a:extLst>
+              <a:ext uri="{FF2B5EF4-FFF2-40B4-BE49-F238E27FC236}">
                 <a16:creationId xmlns:a16="http://schemas.microsoft.com/office/drawing/2014/main" id="{A548310F-2912-4C26-952B-3CF826E4FA65}"/>
               </a:ext>
             </a:extLst>
@@ -6003,7 +6410,7 @@
 </p:sld>
 </file>
 
-<file path=ppt/slides/slide3.xml><?xml version="1.0" encoding="utf-8"?>
+<file path=ppt/slides/slide4.xml><?xml version="1.0" encoding="utf-8"?>
 <p:sld xmlns:a="http://schemas.openxmlformats.org/drawingml/2006/main" xmlns:r="http://schemas.openxmlformats.org/officeDocument/2006/relationships" xmlns:p="http://schemas.openxmlformats.org/presentationml/2006/main">
   <p:cSld>
     <p:spTree>
@@ -6137,7 +6544,7 @@
 </p:sld>
 </file>
 
-<file path=ppt/slides/slide4.xml><?xml version="1.0" encoding="utf-8"?>
+<file path=ppt/slides/slide5.xml><?xml version="1.0" encoding="utf-8"?>
 <p:sld xmlns:a="http://schemas.openxmlformats.org/drawingml/2006/main" xmlns:r="http://schemas.openxmlformats.org/officeDocument/2006/relationships" xmlns:p="http://schemas.openxmlformats.org/presentationml/2006/main">
   <p:cSld>
     <p:spTree>
@@ -6269,7 +6676,7 @@
 </p:sld>
 </file>
 
-<file path=ppt/slides/slide5.xml><?xml version="1.0" encoding="utf-8"?>
+<file path=ppt/slides/slide6.xml><?xml version="1.0" encoding="utf-8"?>
 <p:sld xmlns:a="http://schemas.openxmlformats.org/drawingml/2006/main" xmlns:r="http://schemas.openxmlformats.org/officeDocument/2006/relationships" xmlns:p="http://schemas.openxmlformats.org/presentationml/2006/main">
   <p:cSld>
     <p:spTree>

</xml_diff>